<commit_message>
Update Comparison between stigmergy and gossip algorythm in an agent network.pptx
</commit_message>
<xml_diff>
--- a/slides/Comparison between stigmergy and gossip algorythm in an agent network.pptx
+++ b/slides/Comparison between stigmergy and gossip algorythm in an agent network.pptx
@@ -707,8 +707,8 @@
           <a:bodyPr/>
           <a:lstStyle/>
           <a:p>
-            <a:fld id="{760FBDFE-C587-4B4C-A407-44438C67B59E}" type="datetimeFigureOut">
-              <a:rPr lang="zh-CN" altLang="en-US" smtClean="0"/>
+            <a:fld id="{760FBDFE-C587-4B4C-A407-44438C67B59E}" type="datetime1">
+              <a:rPr lang="en-US" altLang="en-US" smtClean="0"/>
             </a:fld>
             <a:endParaRPr lang="zh-CN" altLang="en-US"/>
           </a:p>
@@ -729,6 +729,18 @@
           <a:bodyPr/>
           <a:lstStyle/>
           <a:p>
+            <a:r>
+              <a:rPr lang="zh-CN" altLang="en-US"/>
+              <a:t>Comparison between stigmergy and gossip algorythm</a:t>
+            </a:r>
+            <a:r>
+              <a:rPr lang="en-US" altLang="zh-CN"/>
+              <a:t>s</a:t>
+            </a:r>
+            <a:r>
+              <a:rPr lang="zh-CN" altLang="en-US"/>
+              <a:t> in an agent network</a:t>
+            </a:r>
             <a:endParaRPr lang="zh-CN" altLang="en-US"/>
           </a:p>
         </p:txBody>
@@ -837,6 +849,7 @@
   <p:clrMapOvr>
     <a:masterClrMapping/>
   </p:clrMapOvr>
+  <p:hf hdr="0"/>
 </p:sldLayout>
 </file>
 
@@ -872,8 +885,8 @@
           <a:bodyPr/>
           <a:lstStyle/>
           <a:p>
-            <a:fld id="{760FBDFE-C587-4B4C-A407-44438C67B59E}" type="datetimeFigureOut">
-              <a:rPr lang="zh-CN" altLang="en-US" smtClean="0"/>
+            <a:fld id="{760FBDFE-C587-4B4C-A407-44438C67B59E}" type="datetime1">
+              <a:rPr lang="en-US" altLang="en-US" smtClean="0"/>
             </a:fld>
             <a:endParaRPr lang="zh-CN" altLang="en-US"/>
           </a:p>
@@ -894,6 +907,10 @@
           <a:bodyPr/>
           <a:lstStyle/>
           <a:p>
+            <a:r>
+              <a:rPr lang="zh-CN" altLang="en-US"/>
+              <a:t>Comparison between stigmergy and gossip algorythms in an agent network</a:t>
+            </a:r>
             <a:endParaRPr lang="zh-CN" altLang="en-US"/>
           </a:p>
         </p:txBody>
@@ -990,6 +1007,7 @@
   <p:clrMapOvr>
     <a:masterClrMapping/>
   </p:clrMapOvr>
+  <p:hf hdr="0"/>
 </p:sldLayout>
 </file>
 
@@ -1185,8 +1203,8 @@
           <a:bodyPr/>
           <a:lstStyle/>
           <a:p>
-            <a:fld id="{760FBDFE-C587-4B4C-A407-44438C67B59E}" type="datetimeFigureOut">
-              <a:rPr lang="zh-CN" altLang="en-US" smtClean="0"/>
+            <a:fld id="{760FBDFE-C587-4B4C-A407-44438C67B59E}" type="datetime1">
+              <a:rPr lang="en-US" altLang="en-US" smtClean="0"/>
             </a:fld>
             <a:endParaRPr lang="zh-CN" altLang="en-US"/>
           </a:p>
@@ -1202,11 +1220,20 @@
             <p:ph type="ftr" sz="quarter" idx="11"/>
           </p:nvPr>
         </p:nvSpPr>
-        <p:spPr/>
+        <p:spPr>
+          <a:xfrm>
+            <a:off x="3173730" y="6356350"/>
+            <a:ext cx="5856605" cy="365125"/>
+          </a:xfrm>
+        </p:spPr>
         <p:txBody>
           <a:bodyPr/>
           <a:lstStyle/>
           <a:p>
+            <a:r>
+              <a:rPr lang="zh-CN" altLang="en-US"/>
+              <a:t>Comparison between stigmergy and gossip algorythms in an agent network</a:t>
+            </a:r>
             <a:endParaRPr lang="zh-CN" altLang="en-US"/>
           </a:p>
         </p:txBody>
@@ -1238,6 +1265,7 @@
   <p:clrMapOvr>
     <a:masterClrMapping/>
   </p:clrMapOvr>
+  <p:hf hdr="0"/>
 </p:sldLayout>
 </file>
 
@@ -1439,8 +1467,8 @@
           <a:bodyPr/>
           <a:lstStyle/>
           <a:p>
-            <a:fld id="{760FBDFE-C587-4B4C-A407-44438C67B59E}" type="datetimeFigureOut">
-              <a:rPr lang="zh-CN" altLang="en-US" smtClean="0"/>
+            <a:fld id="{760FBDFE-C587-4B4C-A407-44438C67B59E}" type="datetime1">
+              <a:rPr lang="en-US" altLang="en-US" smtClean="0"/>
             </a:fld>
             <a:endParaRPr lang="zh-CN" altLang="en-US"/>
           </a:p>
@@ -1461,6 +1489,10 @@
           <a:bodyPr/>
           <a:lstStyle/>
           <a:p>
+            <a:r>
+              <a:rPr lang="zh-CN" altLang="en-US"/>
+              <a:t>Comparison between stigmergy and gossip algorythms in an agent network</a:t>
+            </a:r>
             <a:endParaRPr lang="zh-CN" altLang="en-US"/>
           </a:p>
         </p:txBody>
@@ -1492,6 +1524,7 @@
   <p:clrMapOvr>
     <a:masterClrMapping/>
   </p:clrMapOvr>
+  <p:hf hdr="0"/>
 </p:sldLayout>
 </file>
 
@@ -1835,8 +1868,8 @@
           <a:bodyPr/>
           <a:lstStyle/>
           <a:p>
-            <a:fld id="{760FBDFE-C587-4B4C-A407-44438C67B59E}" type="datetimeFigureOut">
-              <a:rPr lang="zh-CN" altLang="en-US" smtClean="0"/>
+            <a:fld id="{760FBDFE-C587-4B4C-A407-44438C67B59E}" type="datetime1">
+              <a:rPr lang="en-US" altLang="en-US" smtClean="0"/>
             </a:fld>
             <a:endParaRPr lang="zh-CN" altLang="en-US"/>
           </a:p>
@@ -1857,6 +1890,10 @@
           <a:bodyPr/>
           <a:lstStyle/>
           <a:p>
+            <a:r>
+              <a:rPr lang="zh-CN" altLang="en-US"/>
+              <a:t>Comparison between stigmergy and gossip algorythms in an agent network</a:t>
+            </a:r>
             <a:endParaRPr lang="zh-CN" altLang="en-US"/>
           </a:p>
         </p:txBody>
@@ -1888,6 +1925,7 @@
   <p:clrMapOvr>
     <a:masterClrMapping/>
   </p:clrMapOvr>
+  <p:hf hdr="0"/>
 </p:sldLayout>
 </file>
 
@@ -2221,8 +2259,8 @@
           <a:bodyPr/>
           <a:lstStyle/>
           <a:p>
-            <a:fld id="{760FBDFE-C587-4B4C-A407-44438C67B59E}" type="datetimeFigureOut">
-              <a:rPr lang="zh-CN" altLang="en-US" smtClean="0"/>
+            <a:fld id="{760FBDFE-C587-4B4C-A407-44438C67B59E}" type="datetime1">
+              <a:rPr lang="en-US" altLang="en-US" smtClean="0"/>
             </a:fld>
             <a:endParaRPr lang="zh-CN" altLang="en-US"/>
           </a:p>
@@ -2243,6 +2281,10 @@
           <a:bodyPr/>
           <a:lstStyle/>
           <a:p>
+            <a:r>
+              <a:rPr lang="zh-CN" altLang="en-US"/>
+              <a:t>Comparison between stigmergy and gossip algorythms in an agent network</a:t>
+            </a:r>
             <a:endParaRPr lang="zh-CN" altLang="en-US"/>
           </a:p>
         </p:txBody>
@@ -2274,6 +2316,7 @@
   <p:clrMapOvr>
     <a:masterClrMapping/>
   </p:clrMapOvr>
+  <p:hf hdr="0"/>
 </p:sldLayout>
 </file>
 
@@ -2351,8 +2394,8 @@
           <a:bodyPr/>
           <a:lstStyle/>
           <a:p>
-            <a:fld id="{760FBDFE-C587-4B4C-A407-44438C67B59E}" type="datetimeFigureOut">
-              <a:rPr lang="zh-CN" altLang="en-US" smtClean="0"/>
+            <a:fld id="{760FBDFE-C587-4B4C-A407-44438C67B59E}" type="datetime1">
+              <a:rPr lang="en-US" altLang="en-US" smtClean="0"/>
             </a:fld>
             <a:endParaRPr lang="zh-CN" altLang="en-US"/>
           </a:p>
@@ -2373,6 +2416,10 @@
           <a:bodyPr/>
           <a:lstStyle/>
           <a:p>
+            <a:r>
+              <a:rPr lang="zh-CN" altLang="en-US"/>
+              <a:t>Comparison between stigmergy and gossip algorythms in an agent network</a:t>
+            </a:r>
             <a:endParaRPr lang="zh-CN" altLang="en-US"/>
           </a:p>
         </p:txBody>
@@ -2404,6 +2451,7 @@
   <p:clrMapOvr>
     <a:masterClrMapping/>
   </p:clrMapOvr>
+  <p:hf hdr="0"/>
 </p:sldLayout>
 </file>
 
@@ -2439,8 +2487,8 @@
           <a:bodyPr/>
           <a:lstStyle/>
           <a:p>
-            <a:fld id="{760FBDFE-C587-4B4C-A407-44438C67B59E}" type="datetimeFigureOut">
-              <a:rPr lang="zh-CN" altLang="en-US" smtClean="0"/>
+            <a:fld id="{760FBDFE-C587-4B4C-A407-44438C67B59E}" type="datetime1">
+              <a:rPr lang="en-US" altLang="en-US" smtClean="0"/>
             </a:fld>
             <a:endParaRPr lang="zh-CN" altLang="en-US"/>
           </a:p>
@@ -2461,6 +2509,10 @@
           <a:bodyPr/>
           <a:lstStyle/>
           <a:p>
+            <a:r>
+              <a:rPr lang="zh-CN" altLang="en-US"/>
+              <a:t>Comparison between stigmergy and gossip algorythms in an agent network</a:t>
+            </a:r>
             <a:endParaRPr lang="zh-CN" altLang="en-US"/>
           </a:p>
         </p:txBody>
@@ -2492,6 +2544,7 @@
   <p:clrMapOvr>
     <a:masterClrMapping/>
   </p:clrMapOvr>
+  <p:hf hdr="0"/>
 </p:sldLayout>
 </file>
 
@@ -2705,8 +2758,8 @@
           <a:bodyPr/>
           <a:lstStyle/>
           <a:p>
-            <a:fld id="{9EFD9D74-47D9-4702-A33C-335B63B48DBF}" type="datetimeFigureOut">
-              <a:rPr lang="zh-CN" altLang="en-US" smtClean="0"/>
+            <a:fld id="{9EFD9D74-47D9-4702-A33C-335B63B48DBF}" type="datetime1">
+              <a:rPr lang="en-US" altLang="en-US" smtClean="0"/>
             </a:fld>
             <a:endParaRPr lang="zh-CN" altLang="en-US" dirty="0"/>
           </a:p>
@@ -2727,6 +2780,10 @@
           <a:bodyPr/>
           <a:lstStyle/>
           <a:p>
+            <a:r>
+              <a:rPr lang="zh-CN" altLang="en-US" dirty="0"/>
+              <a:t>Comparison between stigmergy and gossip algorythms in an agent network</a:t>
+            </a:r>
             <a:endParaRPr lang="zh-CN" altLang="en-US" dirty="0"/>
           </a:p>
         </p:txBody>
@@ -2788,6 +2845,7 @@
   <p:clrMapOvr>
     <a:masterClrMapping/>
   </p:clrMapOvr>
+  <p:hf hdr="0"/>
 </p:sldLayout>
 </file>
 
@@ -2922,8 +2980,8 @@
           <a:bodyPr/>
           <a:lstStyle/>
           <a:p>
-            <a:fld id="{760FBDFE-C587-4B4C-A407-44438C67B59E}" type="datetimeFigureOut">
-              <a:rPr lang="zh-CN" altLang="en-US" smtClean="0"/>
+            <a:fld id="{760FBDFE-C587-4B4C-A407-44438C67B59E}" type="datetime1">
+              <a:rPr lang="en-US" altLang="en-US" smtClean="0"/>
             </a:fld>
             <a:endParaRPr lang="zh-CN" altLang="en-US"/>
           </a:p>
@@ -2944,6 +3002,10 @@
           <a:bodyPr/>
           <a:lstStyle/>
           <a:p>
+            <a:r>
+              <a:rPr lang="zh-CN" altLang="en-US"/>
+              <a:t>Comparison between stigmergy and gossip algorythms in an agent network</a:t>
+            </a:r>
             <a:endParaRPr lang="zh-CN" altLang="en-US"/>
           </a:p>
         </p:txBody>
@@ -2975,6 +3037,7 @@
   <p:clrMapOvr>
     <a:masterClrMapping/>
   </p:clrMapOvr>
+  <p:hf hdr="0"/>
 </p:sldLayout>
 </file>
 
@@ -3141,8 +3204,8 @@
             </a:lvl1pPr>
           </a:lstStyle>
           <a:p>
-            <a:fld id="{760FBDFE-C587-4B4C-A407-44438C67B59E}" type="datetimeFigureOut">
-              <a:rPr lang="zh-CN" altLang="en-US" smtClean="0"/>
+            <a:fld id="{760FBDFE-C587-4B4C-A407-44438C67B59E}" type="datetime1">
+              <a:rPr lang="en-US" altLang="en-US" smtClean="0"/>
             </a:fld>
             <a:endParaRPr lang="zh-CN" altLang="en-US"/>
           </a:p>
@@ -3183,6 +3246,10 @@
             </a:lvl1pPr>
           </a:lstStyle>
           <a:p>
+            <a:r>
+              <a:rPr lang="zh-CN" altLang="en-US"/>
+              <a:t>Comparison between stigmergy and gossip algorythms in an agent network</a:t>
+            </a:r>
             <a:endParaRPr lang="zh-CN" altLang="en-US"/>
           </a:p>
         </p:txBody>
@@ -3244,6 +3311,7 @@
     <p:sldLayoutId id="2147483657" r:id="rId9"/>
     <p:sldLayoutId id="2147483658" r:id="rId10"/>
   </p:sldLayoutIdLst>
+  <p:hf hdr="0"/>
   <p:txStyles>
     <p:titleStyle>
       <a:lvl1pPr algn="l" defTabSz="914400" rtl="0" eaLnBrk="1" latinLnBrk="0" hangingPunct="1">
@@ -3560,7 +3628,21 @@
           <a:p>
             <a:r>
               <a:rPr lang="en-US" sz="4000"/>
-              <a:t>Comparison between stigmergy and gossip algorythm in an agent network</a:t>
+              <a:t>Comparison between </a:t>
+            </a:r>
+            <a:br>
+              <a:rPr lang="en-US" sz="4000"/>
+            </a:br>
+            <a:r>
+              <a:rPr lang="en-US" sz="4000"/>
+              <a:t>stigmergy and gossip algorythms </a:t>
+            </a:r>
+            <a:br>
+              <a:rPr lang="en-US" sz="4000"/>
+            </a:br>
+            <a:r>
+              <a:rPr lang="en-US" sz="4000"/>
+              <a:t>in an agent network</a:t>
             </a:r>
             <a:endParaRPr lang="en-US" sz="4000"/>
           </a:p>
@@ -3788,6 +3870,70 @@
           </a:p>
         </p:txBody>
       </p:sp>
+      <p:sp>
+        <p:nvSpPr>
+          <p:cNvPr id="4" name="Date Placeholder 3"/>
+          <p:cNvSpPr>
+            <a:spLocks noGrp="1"/>
+          </p:cNvSpPr>
+          <p:nvPr>
+            <p:ph type="dt" sz="half" idx="10"/>
+          </p:nvPr>
+        </p:nvSpPr>
+        <p:spPr/>
+        <p:txBody>
+          <a:bodyPr/>
+          <a:p>
+            <a:fld id="{760FBDFE-C587-4B4C-A407-44438C67B59E}" type="datetime1">
+              <a:rPr lang="en-US" altLang="en-US" smtClean="0"/>
+            </a:fld>
+            <a:endParaRPr lang="zh-CN" altLang="en-US"/>
+          </a:p>
+        </p:txBody>
+      </p:sp>
+      <p:sp>
+        <p:nvSpPr>
+          <p:cNvPr id="5" name="Slide Number Placeholder 4"/>
+          <p:cNvSpPr>
+            <a:spLocks noGrp="1"/>
+          </p:cNvSpPr>
+          <p:nvPr>
+            <p:ph type="sldNum" sz="quarter" idx="12"/>
+          </p:nvPr>
+        </p:nvSpPr>
+        <p:spPr/>
+        <p:txBody>
+          <a:bodyPr/>
+          <a:p>
+            <a:fld id="{49AE70B2-8BF9-45C0-BB95-33D1B9D3A854}" type="slidenum">
+              <a:rPr lang="zh-CN" altLang="en-US" smtClean="0"/>
+            </a:fld>
+            <a:endParaRPr lang="zh-CN" altLang="en-US"/>
+          </a:p>
+        </p:txBody>
+      </p:sp>
+      <p:sp>
+        <p:nvSpPr>
+          <p:cNvPr id="6" name="Footer Placeholder 5"/>
+          <p:cNvSpPr>
+            <a:spLocks noGrp="1"/>
+          </p:cNvSpPr>
+          <p:nvPr>
+            <p:ph type="ftr" sz="quarter" idx="11"/>
+          </p:nvPr>
+        </p:nvSpPr>
+        <p:spPr/>
+        <p:txBody>
+          <a:bodyPr/>
+          <a:p>
+            <a:r>
+              <a:rPr lang="zh-CN" altLang="en-US"/>
+              <a:t>Comparison between stigmergy and gossip algorythms in an agent network</a:t>
+            </a:r>
+            <a:endParaRPr lang="zh-CN" altLang="en-US"/>
+          </a:p>
+        </p:txBody>
+      </p:sp>
     </p:spTree>
   </p:cSld>
   <p:clrMapOvr>
@@ -3854,6 +4000,70 @@
               <a:t>In our case, a shared-memory approach is used as the evironment, the agents “leave” information written on the cell they occupied</a:t>
             </a:r>
             <a:endParaRPr lang="en-US"/>
+          </a:p>
+        </p:txBody>
+      </p:sp>
+      <p:sp>
+        <p:nvSpPr>
+          <p:cNvPr id="4" name="Date Placeholder 3"/>
+          <p:cNvSpPr>
+            <a:spLocks noGrp="1"/>
+          </p:cNvSpPr>
+          <p:nvPr>
+            <p:ph type="dt" sz="half" idx="10"/>
+          </p:nvPr>
+        </p:nvSpPr>
+        <p:spPr/>
+        <p:txBody>
+          <a:bodyPr/>
+          <a:p>
+            <a:fld id="{760FBDFE-C587-4B4C-A407-44438C67B59E}" type="datetime1">
+              <a:rPr lang="en-US" altLang="en-US" smtClean="0"/>
+            </a:fld>
+            <a:endParaRPr lang="zh-CN" altLang="en-US"/>
+          </a:p>
+        </p:txBody>
+      </p:sp>
+      <p:sp>
+        <p:nvSpPr>
+          <p:cNvPr id="5" name="Slide Number Placeholder 4"/>
+          <p:cNvSpPr>
+            <a:spLocks noGrp="1"/>
+          </p:cNvSpPr>
+          <p:nvPr>
+            <p:ph type="sldNum" sz="quarter" idx="12"/>
+          </p:nvPr>
+        </p:nvSpPr>
+        <p:spPr/>
+        <p:txBody>
+          <a:bodyPr/>
+          <a:p>
+            <a:fld id="{49AE70B2-8BF9-45C0-BB95-33D1B9D3A854}" type="slidenum">
+              <a:rPr lang="zh-CN" altLang="en-US" smtClean="0"/>
+            </a:fld>
+            <a:endParaRPr lang="zh-CN" altLang="en-US"/>
+          </a:p>
+        </p:txBody>
+      </p:sp>
+      <p:sp>
+        <p:nvSpPr>
+          <p:cNvPr id="6" name="Footer Placeholder 5"/>
+          <p:cNvSpPr>
+            <a:spLocks noGrp="1"/>
+          </p:cNvSpPr>
+          <p:nvPr>
+            <p:ph type="ftr" sz="quarter" idx="11"/>
+          </p:nvPr>
+        </p:nvSpPr>
+        <p:spPr/>
+        <p:txBody>
+          <a:bodyPr/>
+          <a:p>
+            <a:r>
+              <a:rPr lang="zh-CN" altLang="en-US"/>
+              <a:t>Comparison between stigmergy and gossip algorythms in an agent network</a:t>
+            </a:r>
+            <a:endParaRPr lang="zh-CN" altLang="en-US"/>
           </a:p>
         </p:txBody>
       </p:sp>
@@ -3982,6 +4192,70 @@
           </a:prstGeom>
         </p:spPr>
       </p:pic>
+      <p:sp>
+        <p:nvSpPr>
+          <p:cNvPr id="5" name="Date Placeholder 4"/>
+          <p:cNvSpPr>
+            <a:spLocks noGrp="1"/>
+          </p:cNvSpPr>
+          <p:nvPr>
+            <p:ph type="dt" sz="half" idx="10"/>
+          </p:nvPr>
+        </p:nvSpPr>
+        <p:spPr/>
+        <p:txBody>
+          <a:bodyPr/>
+          <a:p>
+            <a:fld id="{760FBDFE-C587-4B4C-A407-44438C67B59E}" type="datetime1">
+              <a:rPr lang="en-US" altLang="en-US" smtClean="0"/>
+            </a:fld>
+            <a:endParaRPr lang="zh-CN" altLang="en-US"/>
+          </a:p>
+        </p:txBody>
+      </p:sp>
+      <p:sp>
+        <p:nvSpPr>
+          <p:cNvPr id="6" name="Slide Number Placeholder 5"/>
+          <p:cNvSpPr>
+            <a:spLocks noGrp="1"/>
+          </p:cNvSpPr>
+          <p:nvPr>
+            <p:ph type="sldNum" sz="quarter" idx="12"/>
+          </p:nvPr>
+        </p:nvSpPr>
+        <p:spPr/>
+        <p:txBody>
+          <a:bodyPr/>
+          <a:p>
+            <a:fld id="{49AE70B2-8BF9-45C0-BB95-33D1B9D3A854}" type="slidenum">
+              <a:rPr lang="zh-CN" altLang="en-US" smtClean="0"/>
+            </a:fld>
+            <a:endParaRPr lang="zh-CN" altLang="en-US"/>
+          </a:p>
+        </p:txBody>
+      </p:sp>
+      <p:sp>
+        <p:nvSpPr>
+          <p:cNvPr id="7" name="Footer Placeholder 6"/>
+          <p:cNvSpPr>
+            <a:spLocks noGrp="1"/>
+          </p:cNvSpPr>
+          <p:nvPr>
+            <p:ph type="ftr" sz="quarter" idx="11"/>
+          </p:nvPr>
+        </p:nvSpPr>
+        <p:spPr/>
+        <p:txBody>
+          <a:bodyPr/>
+          <a:p>
+            <a:r>
+              <a:rPr lang="zh-CN" altLang="en-US"/>
+              <a:t>Comparison between stigmergy and gossip algorythms in an agent network</a:t>
+            </a:r>
+            <a:endParaRPr lang="zh-CN" altLang="en-US"/>
+          </a:p>
+        </p:txBody>
+      </p:sp>
     </p:spTree>
   </p:cSld>
   <p:clrMapOvr>
@@ -4272,6 +4546,70 @@
           </p:txBody>
         </p:sp>
       </p:grpSp>
+      <p:sp>
+        <p:nvSpPr>
+          <p:cNvPr id="12" name="Date Placeholder 11"/>
+          <p:cNvSpPr>
+            <a:spLocks noGrp="1"/>
+          </p:cNvSpPr>
+          <p:nvPr>
+            <p:ph type="dt" sz="half" idx="10"/>
+          </p:nvPr>
+        </p:nvSpPr>
+        <p:spPr/>
+        <p:txBody>
+          <a:bodyPr/>
+          <a:p>
+            <a:fld id="{760FBDFE-C587-4B4C-A407-44438C67B59E}" type="datetime1">
+              <a:rPr lang="en-US" altLang="en-US" smtClean="0"/>
+            </a:fld>
+            <a:endParaRPr lang="zh-CN" altLang="en-US"/>
+          </a:p>
+        </p:txBody>
+      </p:sp>
+      <p:sp>
+        <p:nvSpPr>
+          <p:cNvPr id="13" name="Slide Number Placeholder 12"/>
+          <p:cNvSpPr>
+            <a:spLocks noGrp="1"/>
+          </p:cNvSpPr>
+          <p:nvPr>
+            <p:ph type="sldNum" sz="quarter" idx="12"/>
+          </p:nvPr>
+        </p:nvSpPr>
+        <p:spPr/>
+        <p:txBody>
+          <a:bodyPr/>
+          <a:p>
+            <a:fld id="{49AE70B2-8BF9-45C0-BB95-33D1B9D3A854}" type="slidenum">
+              <a:rPr lang="zh-CN" altLang="en-US" smtClean="0"/>
+            </a:fld>
+            <a:endParaRPr lang="zh-CN" altLang="en-US"/>
+          </a:p>
+        </p:txBody>
+      </p:sp>
+      <p:sp>
+        <p:nvSpPr>
+          <p:cNvPr id="14" name="Footer Placeholder 13"/>
+          <p:cNvSpPr>
+            <a:spLocks noGrp="1"/>
+          </p:cNvSpPr>
+          <p:nvPr>
+            <p:ph type="ftr" sz="quarter" idx="11"/>
+          </p:nvPr>
+        </p:nvSpPr>
+        <p:spPr/>
+        <p:txBody>
+          <a:bodyPr/>
+          <a:p>
+            <a:r>
+              <a:rPr lang="zh-CN" altLang="en-US"/>
+              <a:t>Comparison between stigmergy and gossip algorythms in an agent network</a:t>
+            </a:r>
+            <a:endParaRPr lang="zh-CN" altLang="en-US"/>
+          </a:p>
+        </p:txBody>
+      </p:sp>
     </p:spTree>
   </p:cSld>
   <p:clrMapOvr>
@@ -4564,6 +4902,70 @@
           </p:txBody>
         </p:sp>
       </p:grpSp>
+      <p:sp>
+        <p:nvSpPr>
+          <p:cNvPr id="12" name="Date Placeholder 11"/>
+          <p:cNvSpPr>
+            <a:spLocks noGrp="1"/>
+          </p:cNvSpPr>
+          <p:nvPr>
+            <p:ph type="dt" sz="half" idx="10"/>
+          </p:nvPr>
+        </p:nvSpPr>
+        <p:spPr/>
+        <p:txBody>
+          <a:bodyPr/>
+          <a:p>
+            <a:fld id="{760FBDFE-C587-4B4C-A407-44438C67B59E}" type="datetime1">
+              <a:rPr lang="en-US" altLang="en-US" smtClean="0"/>
+            </a:fld>
+            <a:endParaRPr lang="zh-CN" altLang="en-US"/>
+          </a:p>
+        </p:txBody>
+      </p:sp>
+      <p:sp>
+        <p:nvSpPr>
+          <p:cNvPr id="13" name="Slide Number Placeholder 12"/>
+          <p:cNvSpPr>
+            <a:spLocks noGrp="1"/>
+          </p:cNvSpPr>
+          <p:nvPr>
+            <p:ph type="sldNum" sz="quarter" idx="12"/>
+          </p:nvPr>
+        </p:nvSpPr>
+        <p:spPr/>
+        <p:txBody>
+          <a:bodyPr/>
+          <a:p>
+            <a:fld id="{49AE70B2-8BF9-45C0-BB95-33D1B9D3A854}" type="slidenum">
+              <a:rPr lang="zh-CN" altLang="en-US" smtClean="0"/>
+            </a:fld>
+            <a:endParaRPr lang="zh-CN" altLang="en-US"/>
+          </a:p>
+        </p:txBody>
+      </p:sp>
+      <p:sp>
+        <p:nvSpPr>
+          <p:cNvPr id="14" name="Footer Placeholder 13"/>
+          <p:cNvSpPr>
+            <a:spLocks noGrp="1"/>
+          </p:cNvSpPr>
+          <p:nvPr>
+            <p:ph type="ftr" sz="quarter" idx="11"/>
+          </p:nvPr>
+        </p:nvSpPr>
+        <p:spPr/>
+        <p:txBody>
+          <a:bodyPr/>
+          <a:p>
+            <a:r>
+              <a:rPr lang="zh-CN" altLang="en-US"/>
+              <a:t>Comparison between stigmergy and gossip algorythms in an agent network</a:t>
+            </a:r>
+            <a:endParaRPr lang="zh-CN" altLang="en-US"/>
+          </a:p>
+        </p:txBody>
+      </p:sp>
     </p:spTree>
   </p:cSld>
   <p:clrMapOvr>
@@ -4626,6 +5028,70 @@
           </a:p>
         </p:txBody>
       </p:sp>
+      <p:sp>
+        <p:nvSpPr>
+          <p:cNvPr id="4" name="Date Placeholder 3"/>
+          <p:cNvSpPr>
+            <a:spLocks noGrp="1"/>
+          </p:cNvSpPr>
+          <p:nvPr>
+            <p:ph type="dt" sz="half" idx="10"/>
+          </p:nvPr>
+        </p:nvSpPr>
+        <p:spPr/>
+        <p:txBody>
+          <a:bodyPr/>
+          <a:p>
+            <a:fld id="{760FBDFE-C587-4B4C-A407-44438C67B59E}" type="datetime1">
+              <a:rPr lang="en-US" altLang="en-US" smtClean="0"/>
+            </a:fld>
+            <a:endParaRPr lang="zh-CN" altLang="en-US"/>
+          </a:p>
+        </p:txBody>
+      </p:sp>
+      <p:sp>
+        <p:nvSpPr>
+          <p:cNvPr id="5" name="Slide Number Placeholder 4"/>
+          <p:cNvSpPr>
+            <a:spLocks noGrp="1"/>
+          </p:cNvSpPr>
+          <p:nvPr>
+            <p:ph type="sldNum" sz="quarter" idx="12"/>
+          </p:nvPr>
+        </p:nvSpPr>
+        <p:spPr/>
+        <p:txBody>
+          <a:bodyPr/>
+          <a:p>
+            <a:fld id="{49AE70B2-8BF9-45C0-BB95-33D1B9D3A854}" type="slidenum">
+              <a:rPr lang="zh-CN" altLang="en-US" smtClean="0"/>
+            </a:fld>
+            <a:endParaRPr lang="zh-CN" altLang="en-US"/>
+          </a:p>
+        </p:txBody>
+      </p:sp>
+      <p:sp>
+        <p:nvSpPr>
+          <p:cNvPr id="6" name="Footer Placeholder 5"/>
+          <p:cNvSpPr>
+            <a:spLocks noGrp="1"/>
+          </p:cNvSpPr>
+          <p:nvPr>
+            <p:ph type="ftr" sz="quarter" idx="11"/>
+          </p:nvPr>
+        </p:nvSpPr>
+        <p:spPr/>
+        <p:txBody>
+          <a:bodyPr/>
+          <a:p>
+            <a:r>
+              <a:rPr lang="zh-CN" altLang="en-US"/>
+              <a:t>Comparison between stigmergy and gossip algorythms in an agent network</a:t>
+            </a:r>
+            <a:endParaRPr lang="zh-CN" altLang="en-US"/>
+          </a:p>
+        </p:txBody>
+      </p:sp>
     </p:spTree>
   </p:cSld>
   <p:clrMapOvr>
@@ -4779,6 +5245,70 @@
           </a:p>
         </p:txBody>
       </p:sp>
+      <p:sp>
+        <p:nvSpPr>
+          <p:cNvPr id="8" name="Date Placeholder 7"/>
+          <p:cNvSpPr>
+            <a:spLocks noGrp="1"/>
+          </p:cNvSpPr>
+          <p:nvPr>
+            <p:ph type="dt" sz="half" idx="10"/>
+          </p:nvPr>
+        </p:nvSpPr>
+        <p:spPr/>
+        <p:txBody>
+          <a:bodyPr/>
+          <a:p>
+            <a:fld id="{760FBDFE-C587-4B4C-A407-44438C67B59E}" type="datetime1">
+              <a:rPr lang="en-US" altLang="en-US" smtClean="0"/>
+            </a:fld>
+            <a:endParaRPr lang="zh-CN" altLang="en-US"/>
+          </a:p>
+        </p:txBody>
+      </p:sp>
+      <p:sp>
+        <p:nvSpPr>
+          <p:cNvPr id="9" name="Slide Number Placeholder 8"/>
+          <p:cNvSpPr>
+            <a:spLocks noGrp="1"/>
+          </p:cNvSpPr>
+          <p:nvPr>
+            <p:ph type="sldNum" sz="quarter" idx="12"/>
+          </p:nvPr>
+        </p:nvSpPr>
+        <p:spPr/>
+        <p:txBody>
+          <a:bodyPr/>
+          <a:p>
+            <a:fld id="{49AE70B2-8BF9-45C0-BB95-33D1B9D3A854}" type="slidenum">
+              <a:rPr lang="zh-CN" altLang="en-US" smtClean="0"/>
+            </a:fld>
+            <a:endParaRPr lang="zh-CN" altLang="en-US"/>
+          </a:p>
+        </p:txBody>
+      </p:sp>
+      <p:sp>
+        <p:nvSpPr>
+          <p:cNvPr id="10" name="Footer Placeholder 9"/>
+          <p:cNvSpPr>
+            <a:spLocks noGrp="1"/>
+          </p:cNvSpPr>
+          <p:nvPr>
+            <p:ph type="ftr" sz="quarter" idx="11"/>
+          </p:nvPr>
+        </p:nvSpPr>
+        <p:spPr/>
+        <p:txBody>
+          <a:bodyPr/>
+          <a:p>
+            <a:r>
+              <a:rPr lang="zh-CN" altLang="en-US"/>
+              <a:t>Comparison between stigmergy and gossip algorythms in an agent network</a:t>
+            </a:r>
+            <a:endParaRPr lang="zh-CN" altLang="en-US"/>
+          </a:p>
+        </p:txBody>
+      </p:sp>
     </p:spTree>
   </p:cSld>
   <p:clrMapOvr>
@@ -4950,6 +5480,70 @@
               <a:t>https://github.com/icotoi/cs-y1-isc1.git</a:t>
             </a:r>
             <a:endParaRPr lang="en-US"/>
+          </a:p>
+        </p:txBody>
+      </p:sp>
+      <p:sp>
+        <p:nvSpPr>
+          <p:cNvPr id="6" name="Date Placeholder 5"/>
+          <p:cNvSpPr>
+            <a:spLocks noGrp="1"/>
+          </p:cNvSpPr>
+          <p:nvPr>
+            <p:ph type="dt" sz="half" idx="10"/>
+          </p:nvPr>
+        </p:nvSpPr>
+        <p:spPr/>
+        <p:txBody>
+          <a:bodyPr/>
+          <a:p>
+            <a:fld id="{760FBDFE-C587-4B4C-A407-44438C67B59E}" type="datetime1">
+              <a:rPr lang="en-US" altLang="en-US" smtClean="0"/>
+            </a:fld>
+            <a:endParaRPr lang="zh-CN" altLang="en-US"/>
+          </a:p>
+        </p:txBody>
+      </p:sp>
+      <p:sp>
+        <p:nvSpPr>
+          <p:cNvPr id="7" name="Slide Number Placeholder 6"/>
+          <p:cNvSpPr>
+            <a:spLocks noGrp="1"/>
+          </p:cNvSpPr>
+          <p:nvPr>
+            <p:ph type="sldNum" sz="quarter" idx="12"/>
+          </p:nvPr>
+        </p:nvSpPr>
+        <p:spPr/>
+        <p:txBody>
+          <a:bodyPr/>
+          <a:p>
+            <a:fld id="{49AE70B2-8BF9-45C0-BB95-33D1B9D3A854}" type="slidenum">
+              <a:rPr lang="zh-CN" altLang="en-US" smtClean="0"/>
+            </a:fld>
+            <a:endParaRPr lang="zh-CN" altLang="en-US"/>
+          </a:p>
+        </p:txBody>
+      </p:sp>
+      <p:sp>
+        <p:nvSpPr>
+          <p:cNvPr id="8" name="Footer Placeholder 7"/>
+          <p:cNvSpPr>
+            <a:spLocks noGrp="1"/>
+          </p:cNvSpPr>
+          <p:nvPr>
+            <p:ph type="ftr" sz="quarter" idx="11"/>
+          </p:nvPr>
+        </p:nvSpPr>
+        <p:spPr/>
+        <p:txBody>
+          <a:bodyPr/>
+          <a:p>
+            <a:r>
+              <a:rPr lang="zh-CN" altLang="en-US"/>
+              <a:t>Comparison between stigmergy and gossip algorythms in an agent network</a:t>
+            </a:r>
+            <a:endParaRPr lang="zh-CN" altLang="en-US"/>
           </a:p>
         </p:txBody>
       </p:sp>

</xml_diff>